<commit_message>
added factor tables, notes, hw, exams
</commit_message>
<xml_diff>
--- a/jiao-research/notes/4-30-20-Overview-of-CVD-processes.pptx
+++ b/jiao-research/notes/4-30-20-Overview-of-CVD-processes.pptx
@@ -283,7 +283,7 @@
           <a:p>
             <a:fld id="{1160EA64-D806-43AC-9DF2-F8C432F32B4C}" type="datetimeFigureOut">
               <a:rPr lang="en-US" dirty="0"/>
-              <a:t>5/1/20</a:t>
+              <a:t>5/5/20</a:t>
             </a:fld>
             <a:endParaRPr lang="en-US" dirty="0"/>
           </a:p>
@@ -449,7 +449,7 @@
           <a:p>
             <a:fld id="{E9F9C37B-1D36-470B-8223-D6C91242EC14}" type="datetimeFigureOut">
               <a:rPr lang="en-US" dirty="0"/>
-              <a:t>5/1/20</a:t>
+              <a:t>5/5/20</a:t>
             </a:fld>
             <a:endParaRPr lang="en-US" dirty="0"/>
           </a:p>
@@ -624,7 +624,7 @@
           <a:p>
             <a:fld id="{67C6F52A-A82B-47A2-A83A-8C4C91F2D59F}" type="datetimeFigureOut">
               <a:rPr lang="en-US" dirty="0"/>
-              <a:t>5/1/20</a:t>
+              <a:t>5/5/20</a:t>
             </a:fld>
             <a:endParaRPr lang="en-US" dirty="0"/>
           </a:p>
@@ -819,7 +819,7 @@
           <a:p>
             <a:fld id="{F070A7B3-6521-4DCA-87E5-044747A908C1}" type="datetimeFigureOut">
               <a:rPr lang="en-US" dirty="0"/>
-              <a:t>5/1/20</a:t>
+              <a:t>5/5/20</a:t>
             </a:fld>
             <a:endParaRPr lang="en-US" dirty="0"/>
           </a:p>
@@ -1084,7 +1084,7 @@
           <a:p>
             <a:fld id="{1160EA64-D806-43AC-9DF2-F8C432F32B4C}" type="datetimeFigureOut">
               <a:rPr lang="en-US" dirty="0"/>
-              <a:t>5/1/20</a:t>
+              <a:t>5/5/20</a:t>
             </a:fld>
             <a:endParaRPr lang="en-US" dirty="0"/>
           </a:p>
@@ -1367,7 +1367,7 @@
           <a:p>
             <a:fld id="{AB134690-1557-4C89-A502-4959FE7FAD70}" type="datetimeFigureOut">
               <a:rPr lang="en-US" dirty="0"/>
-              <a:t>5/1/20</a:t>
+              <a:t>5/5/20</a:t>
             </a:fld>
             <a:endParaRPr lang="en-US" dirty="0"/>
           </a:p>
@@ -1769,7 +1769,7 @@
           <a:p>
             <a:fld id="{4F7D4976-E339-4826-83B7-FBD03F55ECF8}" type="datetimeFigureOut">
               <a:rPr lang="en-US" dirty="0"/>
-              <a:t>5/1/20</a:t>
+              <a:t>5/5/20</a:t>
             </a:fld>
             <a:endParaRPr lang="en-US" dirty="0"/>
           </a:p>
@@ -1915,7 +1915,7 @@
           <a:p>
             <a:fld id="{E1037C31-9E7A-4F99-8774-A0E530DE1A42}" type="datetimeFigureOut">
               <a:rPr lang="en-US" dirty="0"/>
-              <a:t>5/1/20</a:t>
+              <a:t>5/5/20</a:t>
             </a:fld>
             <a:endParaRPr lang="en-US" dirty="0"/>
           </a:p>
@@ -2005,7 +2005,7 @@
           <a:p>
             <a:fld id="{C278504F-A551-4DE0-9316-4DCD1D8CC752}" type="datetimeFigureOut">
               <a:rPr lang="en-US" dirty="0"/>
-              <a:t>5/1/20</a:t>
+              <a:t>5/5/20</a:t>
             </a:fld>
             <a:endParaRPr lang="en-US" dirty="0"/>
           </a:p>
@@ -2356,7 +2356,7 @@
           <a:p>
             <a:fld id="{D1BE4249-C0D0-4B06-8692-E8BB871AF643}" type="datetimeFigureOut">
               <a:rPr lang="en-US" dirty="0"/>
-              <a:t>5/1/20</a:t>
+              <a:t>5/5/20</a:t>
             </a:fld>
             <a:endParaRPr lang="en-US" dirty="0"/>
           </a:p>
@@ -2708,7 +2708,7 @@
           <a:p>
             <a:fld id="{042B0DB6-F5C7-45FB-8CF3-31B45F9C2DAC}" type="datetimeFigureOut">
               <a:rPr lang="en-US" dirty="0"/>
-              <a:t>5/1/20</a:t>
+              <a:t>5/5/20</a:t>
             </a:fld>
             <a:endParaRPr lang="en-US" dirty="0"/>
           </a:p>
@@ -2945,7 +2945,7 @@
           <a:p>
             <a:fld id="{1160EA64-D806-43AC-9DF2-F8C432F32B4C}" type="datetimeFigureOut">
               <a:rPr lang="en-US" dirty="0"/>
-              <a:t>5/1/20</a:t>
+              <a:t>5/5/20</a:t>
             </a:fld>
             <a:endParaRPr lang="en-US" dirty="0"/>
           </a:p>
@@ -3499,6 +3499,36 @@
           </a:p>
         </p:txBody>
       </p:sp>
+      <p:pic>
+        <p:nvPicPr>
+          <p:cNvPr id="5" name="Picture 4">
+            <a:extLst>
+              <a:ext uri="{FF2B5EF4-FFF2-40B4-BE49-F238E27FC236}">
+                <a16:creationId xmlns:a16="http://schemas.microsoft.com/office/drawing/2014/main" id="{45143F7A-DD8C-DE42-BE5F-6563A7A70ADE}"/>
+              </a:ext>
+            </a:extLst>
+          </p:cNvPr>
+          <p:cNvPicPr>
+            <a:picLocks noChangeAspect="1"/>
+          </p:cNvPicPr>
+          <p:nvPr/>
+        </p:nvPicPr>
+        <p:blipFill>
+          <a:blip r:embed="rId2"/>
+          <a:stretch>
+            <a:fillRect/>
+          </a:stretch>
+        </p:blipFill>
+        <p:spPr>
+          <a:xfrm>
+            <a:off x="0" y="0"/>
+            <a:ext cx="12192000" cy="6858000"/>
+          </a:xfrm>
+          <a:prstGeom prst="rect">
+            <a:avLst/>
+          </a:prstGeom>
+        </p:spPr>
+      </p:pic>
     </p:spTree>
     <p:extLst>
       <p:ext uri="{BB962C8B-B14F-4D97-AF65-F5344CB8AC3E}">
@@ -6163,19 +6193,7 @@
               <a:rPr lang="en-US" dirty="0">
                 <a:sym typeface="Wingdings" pitchFamily="2" charset="2"/>
               </a:rPr>
-              <a:t>Simple, good </a:t>
-            </a:r>
-            <a:r>
-              <a:rPr lang="en-US" dirty="0" err="1">
-                <a:sym typeface="Wingdings" pitchFamily="2" charset="2"/>
-              </a:rPr>
-              <a:t>desposition</a:t>
-            </a:r>
-            <a:r>
-              <a:rPr lang="en-US" dirty="0">
-                <a:sym typeface="Wingdings" pitchFamily="2" charset="2"/>
-              </a:rPr>
-              <a:t> rate</a:t>
+              <a:t>Simple, good deposition rate</a:t>
             </a:r>
           </a:p>
           <a:p>
@@ -6999,6 +7017,12 @@
             <a:r>
               <a:rPr lang="en-US" dirty="0"/>
               <a:t>Do these general concepts hold true for most/all deposited materials? Do some materials behave very differently?</a:t>
+            </a:r>
+          </a:p>
+          <a:p>
+            <a:r>
+              <a:rPr lang="en-US" dirty="0"/>
+              <a:t>We use MFC extensively in our lab, is this due to needing low T reactions?</a:t>
             </a:r>
           </a:p>
           <a:p>

</xml_diff>